<commit_message>
Official BMI recalculation, updated presentation with new demographics table
</commit_message>
<xml_diff>
--- a/Project2/Reports/Project 2 Interim Presentation.pptx
+++ b/Project2/Reports/Project 2 Interim Presentation.pptx
@@ -107,6 +107,11 @@
       </a:defRPr>
     </a:lvl9pPr>
   </p:defaultTextStyle>
+  <p:extLst>
+    <p:ext uri="{EFAFB233-063F-42B5-8137-9DF3F51BA10A}">
+      <p15:sldGuideLst xmlns:p15="http://schemas.microsoft.com/office/powerpoint/2012/main"/>
+    </p:ext>
+  </p:extLst>
 </p:presentation>
 </file>
 
@@ -241,7 +246,7 @@
           <a:p>
             <a:fld id="{A619F703-7D9A-4083-A814-7D513770CF9F}" type="datetimeFigureOut">
               <a:rPr lang="en-US" smtClean="0"/>
-              <a:t>10/15/2017</a:t>
+              <a:t>10/16/2017</a:t>
             </a:fld>
             <a:endParaRPr lang="en-US"/>
           </a:p>
@@ -416,7 +421,7 @@
           <a:p>
             <a:fld id="{A619F703-7D9A-4083-A814-7D513770CF9F}" type="datetimeFigureOut">
               <a:rPr lang="en-US" smtClean="0"/>
-              <a:t>10/15/2017</a:t>
+              <a:t>10/16/2017</a:t>
             </a:fld>
             <a:endParaRPr lang="en-US"/>
           </a:p>
@@ -596,7 +601,7 @@
           <a:p>
             <a:fld id="{A619F703-7D9A-4083-A814-7D513770CF9F}" type="datetimeFigureOut">
               <a:rPr lang="en-US" smtClean="0"/>
-              <a:t>10/15/2017</a:t>
+              <a:t>10/16/2017</a:t>
             </a:fld>
             <a:endParaRPr lang="en-US"/>
           </a:p>
@@ -766,7 +771,7 @@
           <a:p>
             <a:fld id="{A619F703-7D9A-4083-A814-7D513770CF9F}" type="datetimeFigureOut">
               <a:rPr lang="en-US" smtClean="0"/>
-              <a:t>10/15/2017</a:t>
+              <a:t>10/16/2017</a:t>
             </a:fld>
             <a:endParaRPr lang="en-US"/>
           </a:p>
@@ -1012,7 +1017,7 @@
           <a:p>
             <a:fld id="{A619F703-7D9A-4083-A814-7D513770CF9F}" type="datetimeFigureOut">
               <a:rPr lang="en-US" smtClean="0"/>
-              <a:t>10/15/2017</a:t>
+              <a:t>10/16/2017</a:t>
             </a:fld>
             <a:endParaRPr lang="en-US"/>
           </a:p>
@@ -1244,7 +1249,7 @@
           <a:p>
             <a:fld id="{A619F703-7D9A-4083-A814-7D513770CF9F}" type="datetimeFigureOut">
               <a:rPr lang="en-US" smtClean="0"/>
-              <a:t>10/15/2017</a:t>
+              <a:t>10/16/2017</a:t>
             </a:fld>
             <a:endParaRPr lang="en-US"/>
           </a:p>
@@ -1611,7 +1616,7 @@
           <a:p>
             <a:fld id="{A619F703-7D9A-4083-A814-7D513770CF9F}" type="datetimeFigureOut">
               <a:rPr lang="en-US" smtClean="0"/>
-              <a:t>10/15/2017</a:t>
+              <a:t>10/16/2017</a:t>
             </a:fld>
             <a:endParaRPr lang="en-US"/>
           </a:p>
@@ -1729,7 +1734,7 @@
           <a:p>
             <a:fld id="{A619F703-7D9A-4083-A814-7D513770CF9F}" type="datetimeFigureOut">
               <a:rPr lang="en-US" smtClean="0"/>
-              <a:t>10/15/2017</a:t>
+              <a:t>10/16/2017</a:t>
             </a:fld>
             <a:endParaRPr lang="en-US"/>
           </a:p>
@@ -1824,7 +1829,7 @@
           <a:p>
             <a:fld id="{A619F703-7D9A-4083-A814-7D513770CF9F}" type="datetimeFigureOut">
               <a:rPr lang="en-US" smtClean="0"/>
-              <a:t>10/15/2017</a:t>
+              <a:t>10/16/2017</a:t>
             </a:fld>
             <a:endParaRPr lang="en-US"/>
           </a:p>
@@ -2106,7 +2111,7 @@
           <a:p>
             <a:fld id="{A619F703-7D9A-4083-A814-7D513770CF9F}" type="datetimeFigureOut">
               <a:rPr lang="en-US" smtClean="0"/>
-              <a:t>10/15/2017</a:t>
+              <a:t>10/16/2017</a:t>
             </a:fld>
             <a:endParaRPr lang="en-US"/>
           </a:p>
@@ -2359,7 +2364,7 @@
           <a:p>
             <a:fld id="{A619F703-7D9A-4083-A814-7D513770CF9F}" type="datetimeFigureOut">
               <a:rPr lang="en-US" smtClean="0"/>
-              <a:t>10/15/2017</a:t>
+              <a:t>10/16/2017</a:t>
             </a:fld>
             <a:endParaRPr lang="en-US"/>
           </a:p>
@@ -2572,7 +2577,7 @@
           <a:p>
             <a:fld id="{A619F703-7D9A-4083-A814-7D513770CF9F}" type="datetimeFigureOut">
               <a:rPr lang="en-US" smtClean="0"/>
-              <a:t>10/15/2017</a:t>
+              <a:t>10/16/2017</a:t>
             </a:fld>
             <a:endParaRPr lang="en-US"/>
           </a:p>
@@ -3090,45 +3095,92 @@
           <a:chExt cx="0" cy="0"/>
         </a:xfrm>
       </p:grpSpPr>
+      <p:sp>
+        <p:nvSpPr>
+          <p:cNvPr id="9" name="TextBox 8"/>
+          <p:cNvSpPr txBox="1"/>
+          <p:nvPr/>
+        </p:nvSpPr>
+        <p:spPr>
+          <a:xfrm>
+            <a:off x="614364" y="400050"/>
+            <a:ext cx="3186112" cy="1938992"/>
+          </a:xfrm>
+          <a:prstGeom prst="rect">
+            <a:avLst/>
+          </a:prstGeom>
+          <a:noFill/>
+        </p:spPr>
+        <p:txBody>
+          <a:bodyPr wrap="square" rtlCol="0">
+            <a:spAutoFit/>
+          </a:bodyPr>
+          <a:lstStyle/>
+          <a:p>
+            <a:pPr algn="ctr"/>
+            <a:r>
+              <a:rPr lang="en-US" sz="4800" dirty="0" smtClean="0">
+                <a:latin typeface="Times New Roman" panose="02020603050405020304" pitchFamily="18" charset="0"/>
+                <a:cs typeface="Times New Roman" panose="02020603050405020304" pitchFamily="18" charset="0"/>
+              </a:rPr>
+              <a:t>Data           Summary</a:t>
+            </a:r>
+          </a:p>
+          <a:p>
+            <a:pPr algn="ctr"/>
+            <a:r>
+              <a:rPr lang="en-US" sz="2400" i="1" dirty="0" smtClean="0">
+                <a:latin typeface="Times New Roman" panose="02020603050405020304" pitchFamily="18" charset="0"/>
+                <a:cs typeface="Times New Roman" panose="02020603050405020304" pitchFamily="18" charset="0"/>
+              </a:rPr>
+              <a:t>last 6 periods (3 years)</a:t>
+            </a:r>
+            <a:endParaRPr lang="en-US" sz="4800" i="1" dirty="0" smtClean="0">
+              <a:latin typeface="Times New Roman" panose="02020603050405020304" pitchFamily="18" charset="0"/>
+              <a:cs typeface="Times New Roman" panose="02020603050405020304" pitchFamily="18" charset="0"/>
+            </a:endParaRPr>
+          </a:p>
+        </p:txBody>
+      </p:sp>
       <p:graphicFrame>
         <p:nvGraphicFramePr>
-          <p:cNvPr id="8" name="Table 7"/>
+          <p:cNvPr id="2" name="Table 1"/>
           <p:cNvGraphicFramePr>
             <a:graphicFrameLocks noGrp="1"/>
           </p:cNvGraphicFramePr>
           <p:nvPr>
             <p:extLst>
               <p:ext uri="{D42A27DB-BD31-4B8C-83A1-F6EECF244321}">
-                <p14:modId xmlns:p14="http://schemas.microsoft.com/office/powerpoint/2010/main" val="686975298"/>
+                <p14:modId xmlns:p14="http://schemas.microsoft.com/office/powerpoint/2010/main" val="1518022291"/>
               </p:ext>
             </p:extLst>
           </p:nvPr>
         </p:nvGraphicFramePr>
         <p:xfrm>
-          <a:off x="4000501" y="171452"/>
-          <a:ext cx="7486649" cy="6457943"/>
+          <a:off x="3800476" y="400050"/>
+          <a:ext cx="7686674" cy="6099600"/>
         </p:xfrm>
         <a:graphic>
           <a:graphicData uri="http://schemas.openxmlformats.org/drawingml/2006/table">
             <a:tbl>
               <a:tblPr/>
               <a:tblGrid>
-                <a:gridCol w="5586192">
+                <a:gridCol w="5378592">
                   <a:extLst>
                     <a:ext uri="{9D8B030D-6E8A-4147-A177-3AD203B41FA5}">
-                      <a16:colId xmlns:a16="http://schemas.microsoft.com/office/drawing/2014/main" val="515311236"/>
+                      <a16:colId xmlns:a16="http://schemas.microsoft.com/office/drawing/2014/main" val="3753465906"/>
                     </a:ext>
                   </a:extLst>
                 </a:gridCol>
-                <a:gridCol w="1900457">
+                <a:gridCol w="2308082">
                   <a:extLst>
                     <a:ext uri="{9D8B030D-6E8A-4147-A177-3AD203B41FA5}">
-                      <a16:colId xmlns:a16="http://schemas.microsoft.com/office/drawing/2014/main" val="2576454305"/>
+                      <a16:colId xmlns:a16="http://schemas.microsoft.com/office/drawing/2014/main" val="3634367124"/>
                     </a:ext>
                   </a:extLst>
                 </a:gridCol>
               </a:tblGrid>
-              <a:tr h="379879">
+              <a:tr h="358800">
                 <a:tc>
                   <a:txBody>
                     <a:bodyPr/>
@@ -3136,7 +3188,7 @@
                     <a:p>
                       <a:pPr algn="l" fontAlgn="b"/>
                       <a:r>
-                        <a:rPr lang="en-US" sz="2000" b="1" i="0" u="none" strike="noStrike">
+                        <a:rPr lang="en-US" sz="2000" b="1" i="0" u="none" strike="noStrike" dirty="0">
                           <a:solidFill>
                             <a:srgbClr val="000000"/>
                           </a:solidFill>
@@ -3172,9 +3224,6 @@
                       <a:headEnd type="none" w="med" len="med"/>
                       <a:tailEnd type="none" w="med" len="med"/>
                     </a:lnB>
-                    <a:solidFill>
-                      <a:srgbClr val="FFFFFF"/>
-                    </a:solidFill>
                   </a:tcPr>
                 </a:tc>
                 <a:tc>
@@ -3191,7 +3240,7 @@
                           <a:effectLst/>
                           <a:latin typeface="Times New Roman" panose="02020603050405020304" pitchFamily="18" charset="0"/>
                         </a:rPr>
-                        <a:t>45</a:t>
+                        <a:t>44</a:t>
                       </a:r>
                     </a:p>
                   </a:txBody>
@@ -3220,18 +3269,15 @@
                       <a:headEnd type="none" w="med" len="med"/>
                       <a:tailEnd type="none" w="med" len="med"/>
                     </a:lnB>
-                    <a:solidFill>
-                      <a:srgbClr val="FFFFFF"/>
-                    </a:solidFill>
                   </a:tcPr>
                 </a:tc>
                 <a:extLst>
                   <a:ext uri="{0D108BD9-81ED-4DB2-BD59-A6C34878D82A}">
-                    <a16:rowId xmlns:a16="http://schemas.microsoft.com/office/drawing/2014/main" val="3503263168"/>
+                    <a16:rowId xmlns:a16="http://schemas.microsoft.com/office/drawing/2014/main" val="3997455226"/>
                   </a:ext>
                 </a:extLst>
               </a:tr>
-              <a:tr h="379879">
+              <a:tr h="358800">
                 <a:tc>
                   <a:txBody>
                     <a:bodyPr/>
@@ -3239,7 +3285,7 @@
                     <a:p>
                       <a:pPr algn="l" fontAlgn="b"/>
                       <a:r>
-                        <a:rPr lang="en-US" sz="2000" b="1" i="0" u="none" strike="noStrike" dirty="0">
+                        <a:rPr lang="en-US" sz="2000" b="1" i="0" u="none" strike="noStrike">
                           <a:solidFill>
                             <a:srgbClr val="000000"/>
                           </a:solidFill>
@@ -3281,26 +3327,23 @@
                       <a:headEnd type="none" w="med" len="med"/>
                       <a:tailEnd type="none" w="med" len="med"/>
                     </a:lnB>
-                    <a:solidFill>
-                      <a:srgbClr val="FFFFFF"/>
-                    </a:solidFill>
-                  </a:tcPr>
-                </a:tc>
-                <a:tc>
-                  <a:txBody>
-                    <a:bodyPr/>
-                    <a:lstStyle/>
-                    <a:p>
-                      <a:pPr algn="ctr" fontAlgn="b"/>
-                      <a:r>
-                        <a:rPr lang="en-US" sz="2000" b="0" i="0" u="none" strike="noStrike" dirty="0">
-                          <a:solidFill>
-                            <a:srgbClr val="000000"/>
-                          </a:solidFill>
-                          <a:effectLst/>
-                          <a:latin typeface="Times New Roman" panose="02020603050405020304" pitchFamily="18" charset="0"/>
-                        </a:rPr>
-                        <a:t>26518</a:t>
+                  </a:tcPr>
+                </a:tc>
+                <a:tc>
+                  <a:txBody>
+                    <a:bodyPr/>
+                    <a:lstStyle/>
+                    <a:p>
+                      <a:pPr algn="ctr" fontAlgn="b"/>
+                      <a:r>
+                        <a:rPr lang="en-US" sz="2000" b="0" i="0" u="none" strike="noStrike">
+                          <a:solidFill>
+                            <a:srgbClr val="000000"/>
+                          </a:solidFill>
+                          <a:effectLst/>
+                          <a:latin typeface="Times New Roman" panose="02020603050405020304" pitchFamily="18" charset="0"/>
+                        </a:rPr>
+                        <a:t>26520</a:t>
                       </a:r>
                     </a:p>
                   </a:txBody>
@@ -3335,18 +3378,15 @@
                       <a:headEnd type="none" w="med" len="med"/>
                       <a:tailEnd type="none" w="med" len="med"/>
                     </a:lnB>
-                    <a:solidFill>
-                      <a:srgbClr val="FFFFFF"/>
-                    </a:solidFill>
                   </a:tcPr>
                 </a:tc>
                 <a:extLst>
                   <a:ext uri="{0D108BD9-81ED-4DB2-BD59-A6C34878D82A}">
-                    <a16:rowId xmlns:a16="http://schemas.microsoft.com/office/drawing/2014/main" val="4287332137"/>
+                    <a16:rowId xmlns:a16="http://schemas.microsoft.com/office/drawing/2014/main" val="3259296893"/>
                   </a:ext>
                 </a:extLst>
               </a:tr>
-              <a:tr h="379879">
+              <a:tr h="358800">
                 <a:tc>
                   <a:txBody>
                     <a:bodyPr/>
@@ -3390,27 +3430,21 @@
                     <a:lnB>
                       <a:noFill/>
                     </a:lnB>
-                    <a:solidFill>
-                      <a:srgbClr val="FFFFFF"/>
-                    </a:solidFill>
-                  </a:tcPr>
-                </a:tc>
-                <a:tc>
-                  <a:txBody>
-                    <a:bodyPr/>
-                    <a:lstStyle/>
-                    <a:p>
-                      <a:pPr algn="ctr" fontAlgn="b"/>
-                      <a:r>
-                        <a:rPr lang="en-US" sz="2000" b="0" i="0" u="none" strike="noStrike">
-                          <a:solidFill>
-                            <a:srgbClr val="000000"/>
-                          </a:solidFill>
-                          <a:effectLst/>
-                          <a:latin typeface="Times New Roman" panose="02020603050405020304" pitchFamily="18" charset="0"/>
-                        </a:rPr>
-                        <a:t> </a:t>
-                      </a:r>
+                  </a:tcPr>
+                </a:tc>
+                <a:tc>
+                  <a:txBody>
+                    <a:bodyPr/>
+                    <a:lstStyle/>
+                    <a:p>
+                      <a:pPr algn="ctr" fontAlgn="b"/>
+                      <a:endParaRPr lang="en-US" sz="2000" b="0" i="0" u="none" strike="noStrike">
+                        <a:solidFill>
+                          <a:srgbClr val="000000"/>
+                        </a:solidFill>
+                        <a:effectLst/>
+                        <a:latin typeface="Times New Roman" panose="02020603050405020304" pitchFamily="18" charset="0"/>
+                      </a:endParaRPr>
                     </a:p>
                   </a:txBody>
                   <a:tcPr marL="9525" marR="9525" marT="9525" marB="0" anchor="b">
@@ -3438,18 +3472,15 @@
                     <a:lnB>
                       <a:noFill/>
                     </a:lnB>
-                    <a:solidFill>
-                      <a:srgbClr val="FFFFFF"/>
-                    </a:solidFill>
                   </a:tcPr>
                 </a:tc>
                 <a:extLst>
                   <a:ext uri="{0D108BD9-81ED-4DB2-BD59-A6C34878D82A}">
-                    <a16:rowId xmlns:a16="http://schemas.microsoft.com/office/drawing/2014/main" val="2384555124"/>
+                    <a16:rowId xmlns:a16="http://schemas.microsoft.com/office/drawing/2014/main" val="2016044663"/>
                   </a:ext>
                 </a:extLst>
               </a:tr>
-              <a:tr h="379879">
+              <a:tr h="358800">
                 <a:tc>
                   <a:txBody>
                     <a:bodyPr/>
@@ -3487,9 +3518,6 @@
                     <a:lnB>
                       <a:noFill/>
                     </a:lnB>
-                    <a:solidFill>
-                      <a:srgbClr val="FFFFFF"/>
-                    </a:solidFill>
                   </a:tcPr>
                 </a:tc>
                 <a:tc>
@@ -3506,7 +3534,7 @@
                           <a:effectLst/>
                           <a:latin typeface="Times New Roman" panose="02020603050405020304" pitchFamily="18" charset="0"/>
                         </a:rPr>
-                        <a:t>6174 (23.28)</a:t>
+                        <a:t>5612 (21.16)</a:t>
                       </a:r>
                     </a:p>
                   </a:txBody>
@@ -3529,18 +3557,15 @@
                     <a:lnB>
                       <a:noFill/>
                     </a:lnB>
-                    <a:solidFill>
-                      <a:srgbClr val="FFFFFF"/>
-                    </a:solidFill>
                   </a:tcPr>
                 </a:tc>
                 <a:extLst>
                   <a:ext uri="{0D108BD9-81ED-4DB2-BD59-A6C34878D82A}">
-                    <a16:rowId xmlns:a16="http://schemas.microsoft.com/office/drawing/2014/main" val="1103271160"/>
+                    <a16:rowId xmlns:a16="http://schemas.microsoft.com/office/drawing/2014/main" val="1209378226"/>
                   </a:ext>
                 </a:extLst>
               </a:tr>
-              <a:tr h="379879">
+              <a:tr h="358800">
                 <a:tc>
                   <a:txBody>
                     <a:bodyPr/>
@@ -3548,7 +3573,7 @@
                     <a:p>
                       <a:pPr algn="l" fontAlgn="b"/>
                       <a:r>
-                        <a:rPr lang="en-US" sz="2000" b="0" i="0" u="none" strike="noStrike" dirty="0">
+                        <a:rPr lang="en-US" sz="2000" b="0" i="0" u="none" strike="noStrike">
                           <a:solidFill>
                             <a:srgbClr val="000000"/>
                           </a:solidFill>
@@ -3584,9 +3609,6 @@
                       <a:headEnd type="none" w="med" len="med"/>
                       <a:tailEnd type="none" w="med" len="med"/>
                     </a:lnB>
-                    <a:solidFill>
-                      <a:srgbClr val="FFFFFF"/>
-                    </a:solidFill>
                   </a:tcPr>
                 </a:tc>
                 <a:tc>
@@ -3603,7 +3625,7 @@
                           <a:effectLst/>
                           <a:latin typeface="Times New Roman" panose="02020603050405020304" pitchFamily="18" charset="0"/>
                         </a:rPr>
-                        <a:t>21589 (81.41)</a:t>
+                        <a:t>21459 (80.92)</a:t>
                       </a:r>
                     </a:p>
                   </a:txBody>
@@ -3632,18 +3654,15 @@
                       <a:headEnd type="none" w="med" len="med"/>
                       <a:tailEnd type="none" w="med" len="med"/>
                     </a:lnB>
-                    <a:solidFill>
-                      <a:srgbClr val="FFFFFF"/>
-                    </a:solidFill>
                   </a:tcPr>
                 </a:tc>
                 <a:extLst>
                   <a:ext uri="{0D108BD9-81ED-4DB2-BD59-A6C34878D82A}">
-                    <a16:rowId xmlns:a16="http://schemas.microsoft.com/office/drawing/2014/main" val="717238123"/>
+                    <a16:rowId xmlns:a16="http://schemas.microsoft.com/office/drawing/2014/main" val="1870187801"/>
                   </a:ext>
                 </a:extLst>
               </a:tr>
-              <a:tr h="379879">
+              <a:tr h="358800">
                 <a:tc>
                   <a:txBody>
                     <a:bodyPr/>
@@ -3687,27 +3706,21 @@
                     <a:lnB>
                       <a:noFill/>
                     </a:lnB>
-                    <a:solidFill>
-                      <a:srgbClr val="FFFFFF"/>
-                    </a:solidFill>
-                  </a:tcPr>
-                </a:tc>
-                <a:tc>
-                  <a:txBody>
-                    <a:bodyPr/>
-                    <a:lstStyle/>
-                    <a:p>
-                      <a:pPr algn="ctr" fontAlgn="b"/>
-                      <a:r>
-                        <a:rPr lang="en-US" sz="2000" b="0" i="0" u="none" strike="noStrike">
-                          <a:solidFill>
-                            <a:srgbClr val="000000"/>
-                          </a:solidFill>
-                          <a:effectLst/>
-                          <a:latin typeface="Times New Roman" panose="02020603050405020304" pitchFamily="18" charset="0"/>
-                        </a:rPr>
-                        <a:t> </a:t>
-                      </a:r>
+                  </a:tcPr>
+                </a:tc>
+                <a:tc>
+                  <a:txBody>
+                    <a:bodyPr/>
+                    <a:lstStyle/>
+                    <a:p>
+                      <a:pPr algn="ctr" fontAlgn="b"/>
+                      <a:endParaRPr lang="en-US" sz="2000" b="0" i="0" u="none" strike="noStrike">
+                        <a:solidFill>
+                          <a:srgbClr val="000000"/>
+                        </a:solidFill>
+                        <a:effectLst/>
+                        <a:latin typeface="Times New Roman" panose="02020603050405020304" pitchFamily="18" charset="0"/>
+                      </a:endParaRPr>
                     </a:p>
                   </a:txBody>
                   <a:tcPr marL="9525" marR="9525" marT="9525" marB="0" anchor="b">
@@ -3735,18 +3748,15 @@
                     <a:lnB>
                       <a:noFill/>
                     </a:lnB>
-                    <a:solidFill>
-                      <a:srgbClr val="FFFFFF"/>
-                    </a:solidFill>
                   </a:tcPr>
                 </a:tc>
                 <a:extLst>
                   <a:ext uri="{0D108BD9-81ED-4DB2-BD59-A6C34878D82A}">
-                    <a16:rowId xmlns:a16="http://schemas.microsoft.com/office/drawing/2014/main" val="3241912740"/>
+                    <a16:rowId xmlns:a16="http://schemas.microsoft.com/office/drawing/2014/main" val="128430640"/>
                   </a:ext>
                 </a:extLst>
               </a:tr>
-              <a:tr h="379879">
+              <a:tr h="358800">
                 <a:tc>
                   <a:txBody>
                     <a:bodyPr/>
@@ -3784,9 +3794,6 @@
                     <a:lnB>
                       <a:noFill/>
                     </a:lnB>
-                    <a:solidFill>
-                      <a:srgbClr val="FFFFFF"/>
-                    </a:solidFill>
                   </a:tcPr>
                 </a:tc>
                 <a:tc>
@@ -3826,18 +3833,15 @@
                     <a:lnB>
                       <a:noFill/>
                     </a:lnB>
-                    <a:solidFill>
-                      <a:srgbClr val="FFFFFF"/>
-                    </a:solidFill>
                   </a:tcPr>
                 </a:tc>
                 <a:extLst>
                   <a:ext uri="{0D108BD9-81ED-4DB2-BD59-A6C34878D82A}">
-                    <a16:rowId xmlns:a16="http://schemas.microsoft.com/office/drawing/2014/main" val="311997291"/>
+                    <a16:rowId xmlns:a16="http://schemas.microsoft.com/office/drawing/2014/main" val="4173892677"/>
                   </a:ext>
                 </a:extLst>
               </a:tr>
-              <a:tr h="379879">
+              <a:tr h="358800">
                 <a:tc>
                   <a:txBody>
                     <a:bodyPr/>
@@ -3875,9 +3879,6 @@
                     <a:lnB>
                       <a:noFill/>
                     </a:lnB>
-                    <a:solidFill>
-                      <a:srgbClr val="FFFFFF"/>
-                    </a:solidFill>
                   </a:tcPr>
                 </a:tc>
                 <a:tc>
@@ -3894,7 +3895,7 @@
                           <a:effectLst/>
                           <a:latin typeface="Times New Roman" panose="02020603050405020304" pitchFamily="18" charset="0"/>
                         </a:rPr>
-                        <a:t>1082 (4.08)</a:t>
+                        <a:t>1115 (4.2)</a:t>
                       </a:r>
                     </a:p>
                   </a:txBody>
@@ -3917,18 +3918,15 @@
                     <a:lnB>
                       <a:noFill/>
                     </a:lnB>
-                    <a:solidFill>
-                      <a:srgbClr val="FFFFFF"/>
-                    </a:solidFill>
                   </a:tcPr>
                 </a:tc>
                 <a:extLst>
                   <a:ext uri="{0D108BD9-81ED-4DB2-BD59-A6C34878D82A}">
-                    <a16:rowId xmlns:a16="http://schemas.microsoft.com/office/drawing/2014/main" val="2328855230"/>
+                    <a16:rowId xmlns:a16="http://schemas.microsoft.com/office/drawing/2014/main" val="320094253"/>
                   </a:ext>
                 </a:extLst>
               </a:tr>
-              <a:tr h="379879">
+              <a:tr h="358800">
                 <a:tc>
                   <a:txBody>
                     <a:bodyPr/>
@@ -3966,26 +3964,23 @@
                     <a:lnB>
                       <a:noFill/>
                     </a:lnB>
-                    <a:solidFill>
-                      <a:srgbClr val="FFFFFF"/>
-                    </a:solidFill>
-                  </a:tcPr>
-                </a:tc>
-                <a:tc>
-                  <a:txBody>
-                    <a:bodyPr/>
-                    <a:lstStyle/>
-                    <a:p>
-                      <a:pPr algn="ctr" fontAlgn="b"/>
-                      <a:r>
-                        <a:rPr lang="en-US" sz="2000" b="0" i="0" u="none" strike="noStrike">
-                          <a:solidFill>
-                            <a:srgbClr val="000000"/>
-                          </a:solidFill>
-                          <a:effectLst/>
-                          <a:latin typeface="Times New Roman" panose="02020603050405020304" pitchFamily="18" charset="0"/>
-                        </a:rPr>
-                        <a:t>5020 (18.93)</a:t>
+                  </a:tcPr>
+                </a:tc>
+                <a:tc>
+                  <a:txBody>
+                    <a:bodyPr/>
+                    <a:lstStyle/>
+                    <a:p>
+                      <a:pPr algn="ctr" fontAlgn="b"/>
+                      <a:r>
+                        <a:rPr lang="en-US" sz="2000" b="0" i="0" u="none" strike="noStrike" dirty="0">
+                          <a:solidFill>
+                            <a:srgbClr val="000000"/>
+                          </a:solidFill>
+                          <a:effectLst/>
+                          <a:latin typeface="Times New Roman" panose="02020603050405020304" pitchFamily="18" charset="0"/>
+                        </a:rPr>
+                        <a:t>5161 (19.46)</a:t>
                       </a:r>
                     </a:p>
                   </a:txBody>
@@ -4008,18 +4003,15 @@
                     <a:lnB>
                       <a:noFill/>
                     </a:lnB>
-                    <a:solidFill>
-                      <a:srgbClr val="FFFFFF"/>
-                    </a:solidFill>
                   </a:tcPr>
                 </a:tc>
                 <a:extLst>
                   <a:ext uri="{0D108BD9-81ED-4DB2-BD59-A6C34878D82A}">
-                    <a16:rowId xmlns:a16="http://schemas.microsoft.com/office/drawing/2014/main" val="3635424899"/>
+                    <a16:rowId xmlns:a16="http://schemas.microsoft.com/office/drawing/2014/main" val="3314364870"/>
                   </a:ext>
                 </a:extLst>
               </a:tr>
-              <a:tr h="379879">
+              <a:tr h="358800">
                 <a:tc>
                   <a:txBody>
                     <a:bodyPr/>
@@ -4057,9 +4049,6 @@
                     <a:lnB>
                       <a:noFill/>
                     </a:lnB>
-                    <a:solidFill>
-                      <a:srgbClr val="FFFFFF"/>
-                    </a:solidFill>
                   </a:tcPr>
                 </a:tc>
                 <a:tc>
@@ -4076,7 +4065,7 @@
                           <a:effectLst/>
                           <a:latin typeface="Times New Roman" panose="02020603050405020304" pitchFamily="18" charset="0"/>
                         </a:rPr>
-                        <a:t>18981 (71.58)</a:t>
+                        <a:t>19504 (73.54)</a:t>
                       </a:r>
                     </a:p>
                   </a:txBody>
@@ -4099,18 +4088,15 @@
                     <a:lnB>
                       <a:noFill/>
                     </a:lnB>
-                    <a:solidFill>
-                      <a:srgbClr val="FFFFFF"/>
-                    </a:solidFill>
                   </a:tcPr>
                 </a:tc>
                 <a:extLst>
                   <a:ext uri="{0D108BD9-81ED-4DB2-BD59-A6C34878D82A}">
-                    <a16:rowId xmlns:a16="http://schemas.microsoft.com/office/drawing/2014/main" val="1520640699"/>
+                    <a16:rowId xmlns:a16="http://schemas.microsoft.com/office/drawing/2014/main" val="113260376"/>
                   </a:ext>
                 </a:extLst>
               </a:tr>
-              <a:tr h="379879">
+              <a:tr h="358800">
                 <a:tc>
                   <a:txBody>
                     <a:bodyPr/>
@@ -4148,9 +4134,6 @@
                     <a:lnB>
                       <a:noFill/>
                     </a:lnB>
-                    <a:solidFill>
-                      <a:srgbClr val="FFFFFF"/>
-                    </a:solidFill>
                   </a:tcPr>
                 </a:tc>
                 <a:tc>
@@ -4167,7 +4150,7 @@
                           <a:effectLst/>
                           <a:latin typeface="Times New Roman" panose="02020603050405020304" pitchFamily="18" charset="0"/>
                         </a:rPr>
-                        <a:t>54 (0.2)</a:t>
+                        <a:t>55 (0.21)</a:t>
                       </a:r>
                     </a:p>
                   </a:txBody>
@@ -4190,18 +4173,15 @@
                     <a:lnB>
                       <a:noFill/>
                     </a:lnB>
-                    <a:solidFill>
-                      <a:srgbClr val="FFFFFF"/>
-                    </a:solidFill>
                   </a:tcPr>
                 </a:tc>
                 <a:extLst>
                   <a:ext uri="{0D108BD9-81ED-4DB2-BD59-A6C34878D82A}">
-                    <a16:rowId xmlns:a16="http://schemas.microsoft.com/office/drawing/2014/main" val="151260815"/>
+                    <a16:rowId xmlns:a16="http://schemas.microsoft.com/office/drawing/2014/main" val="3753200961"/>
                   </a:ext>
                 </a:extLst>
               </a:tr>
-              <a:tr h="379879">
+              <a:tr h="358800">
                 <a:tc>
                   <a:txBody>
                     <a:bodyPr/>
@@ -4245,9 +4225,6 @@
                       <a:headEnd type="none" w="med" len="med"/>
                       <a:tailEnd type="none" w="med" len="med"/>
                     </a:lnB>
-                    <a:solidFill>
-                      <a:srgbClr val="FFFFFF"/>
-                    </a:solidFill>
                   </a:tcPr>
                 </a:tc>
                 <a:tc>
@@ -4264,7 +4241,7 @@
                           <a:effectLst/>
                           <a:latin typeface="Times New Roman" panose="02020603050405020304" pitchFamily="18" charset="0"/>
                         </a:rPr>
-                        <a:t>1360 (5.13)</a:t>
+                        <a:t>664 (2.5)</a:t>
                       </a:r>
                     </a:p>
                   </a:txBody>
@@ -4293,18 +4270,15 @@
                       <a:headEnd type="none" w="med" len="med"/>
                       <a:tailEnd type="none" w="med" len="med"/>
                     </a:lnB>
-                    <a:solidFill>
-                      <a:srgbClr val="FFFFFF"/>
-                    </a:solidFill>
                   </a:tcPr>
                 </a:tc>
                 <a:extLst>
                   <a:ext uri="{0D108BD9-81ED-4DB2-BD59-A6C34878D82A}">
-                    <a16:rowId xmlns:a16="http://schemas.microsoft.com/office/drawing/2014/main" val="1342043523"/>
+                    <a16:rowId xmlns:a16="http://schemas.microsoft.com/office/drawing/2014/main" val="1782638892"/>
                   </a:ext>
                 </a:extLst>
               </a:tr>
-              <a:tr h="379879">
+              <a:tr h="358800">
                 <a:tc>
                   <a:txBody>
                     <a:bodyPr/>
@@ -4348,9 +4322,6 @@
                     <a:lnB>
                       <a:noFill/>
                     </a:lnB>
-                    <a:solidFill>
-                      <a:srgbClr val="FFFFFF"/>
-                    </a:solidFill>
                   </a:tcPr>
                 </a:tc>
                 <a:tc>
@@ -4396,18 +4367,15 @@
                     <a:lnB>
                       <a:noFill/>
                     </a:lnB>
-                    <a:solidFill>
-                      <a:srgbClr val="FFFFFF"/>
-                    </a:solidFill>
                   </a:tcPr>
                 </a:tc>
                 <a:extLst>
                   <a:ext uri="{0D108BD9-81ED-4DB2-BD59-A6C34878D82A}">
-                    <a16:rowId xmlns:a16="http://schemas.microsoft.com/office/drawing/2014/main" val="687114478"/>
+                    <a16:rowId xmlns:a16="http://schemas.microsoft.com/office/drawing/2014/main" val="4145700885"/>
                   </a:ext>
                 </a:extLst>
               </a:tr>
-              <a:tr h="379879">
+              <a:tr h="358800">
                 <a:tc>
                   <a:txBody>
                     <a:bodyPr/>
@@ -4451,9 +4419,6 @@
                       <a:headEnd type="none" w="med" len="med"/>
                       <a:tailEnd type="none" w="med" len="med"/>
                     </a:lnB>
-                    <a:solidFill>
-                      <a:srgbClr val="FFFFFF"/>
-                    </a:solidFill>
                   </a:tcPr>
                 </a:tc>
                 <a:tc>
@@ -4499,18 +4464,15 @@
                       <a:headEnd type="none" w="med" len="med"/>
                       <a:tailEnd type="none" w="med" len="med"/>
                     </a:lnB>
-                    <a:solidFill>
-                      <a:srgbClr val="FFFFFF"/>
-                    </a:solidFill>
                   </a:tcPr>
                 </a:tc>
                 <a:extLst>
                   <a:ext uri="{0D108BD9-81ED-4DB2-BD59-A6C34878D82A}">
-                    <a16:rowId xmlns:a16="http://schemas.microsoft.com/office/drawing/2014/main" val="2168057465"/>
+                    <a16:rowId xmlns:a16="http://schemas.microsoft.com/office/drawing/2014/main" val="3623476557"/>
                   </a:ext>
                 </a:extLst>
               </a:tr>
-              <a:tr h="379879">
+              <a:tr h="358800">
                 <a:tc>
                   <a:txBody>
                     <a:bodyPr/>
@@ -4554,9 +4516,6 @@
                     <a:lnB>
                       <a:noFill/>
                     </a:lnB>
-                    <a:solidFill>
-                      <a:srgbClr val="FFFFFF"/>
-                    </a:solidFill>
                   </a:tcPr>
                 </a:tc>
                 <a:tc>
@@ -4602,18 +4561,15 @@
                     <a:lnB>
                       <a:noFill/>
                     </a:lnB>
-                    <a:solidFill>
-                      <a:srgbClr val="FFFFFF"/>
-                    </a:solidFill>
                   </a:tcPr>
                 </a:tc>
                 <a:extLst>
                   <a:ext uri="{0D108BD9-81ED-4DB2-BD59-A6C34878D82A}">
-                    <a16:rowId xmlns:a16="http://schemas.microsoft.com/office/drawing/2014/main" val="2285775036"/>
+                    <a16:rowId xmlns:a16="http://schemas.microsoft.com/office/drawing/2014/main" val="1950223754"/>
                   </a:ext>
                 </a:extLst>
               </a:tr>
-              <a:tr h="379879">
+              <a:tr h="358800">
                 <a:tc>
                   <a:txBody>
                     <a:bodyPr/>
@@ -4657,26 +4613,23 @@
                       <a:headEnd type="none" w="med" len="med"/>
                       <a:tailEnd type="none" w="med" len="med"/>
                     </a:lnB>
-                    <a:solidFill>
-                      <a:srgbClr val="FFFFFF"/>
-                    </a:solidFill>
-                  </a:tcPr>
-                </a:tc>
-                <a:tc>
-                  <a:txBody>
-                    <a:bodyPr/>
-                    <a:lstStyle/>
-                    <a:p>
-                      <a:pPr algn="ctr" fontAlgn="b"/>
-                      <a:r>
-                        <a:rPr lang="en-US" sz="2000" b="0" i="0" u="none" strike="noStrike">
-                          <a:solidFill>
-                            <a:srgbClr val="000000"/>
-                          </a:solidFill>
-                          <a:effectLst/>
-                          <a:latin typeface="Times New Roman" panose="02020603050405020304" pitchFamily="18" charset="0"/>
-                        </a:rPr>
-                        <a:t>13591 (51.25)</a:t>
+                  </a:tcPr>
+                </a:tc>
+                <a:tc>
+                  <a:txBody>
+                    <a:bodyPr/>
+                    <a:lstStyle/>
+                    <a:p>
+                      <a:pPr algn="ctr" fontAlgn="b"/>
+                      <a:r>
+                        <a:rPr lang="en-US" sz="2000" b="0" i="0" u="none" strike="noStrike" dirty="0">
+                          <a:solidFill>
+                            <a:srgbClr val="000000"/>
+                          </a:solidFill>
+                          <a:effectLst/>
+                          <a:latin typeface="Times New Roman" panose="02020603050405020304" pitchFamily="18" charset="0"/>
+                        </a:rPr>
+                        <a:t>13241 (49.93)</a:t>
                       </a:r>
                     </a:p>
                   </a:txBody>
@@ -4705,18 +4658,15 @@
                       <a:headEnd type="none" w="med" len="med"/>
                       <a:tailEnd type="none" w="med" len="med"/>
                     </a:lnB>
-                    <a:solidFill>
-                      <a:srgbClr val="FFFFFF"/>
-                    </a:solidFill>
                   </a:tcPr>
                 </a:tc>
                 <a:extLst>
                   <a:ext uri="{0D108BD9-81ED-4DB2-BD59-A6C34878D82A}">
-                    <a16:rowId xmlns:a16="http://schemas.microsoft.com/office/drawing/2014/main" val="2661927856"/>
+                    <a16:rowId xmlns:a16="http://schemas.microsoft.com/office/drawing/2014/main" val="250077240"/>
                   </a:ext>
                 </a:extLst>
               </a:tr>
-              <a:tr h="379879">
+              <a:tr h="358800">
                 <a:tc>
                   <a:txBody>
                     <a:bodyPr/>
@@ -4724,7 +4674,7 @@
                     <a:p>
                       <a:pPr algn="l" fontAlgn="b"/>
                       <a:r>
-                        <a:rPr lang="en-US" sz="2000" b="1" i="0" u="none" strike="noStrike" dirty="0">
+                        <a:rPr lang="en-US" sz="2000" b="1" i="0" u="none" strike="noStrike">
                           <a:solidFill>
                             <a:srgbClr val="000000"/>
                           </a:solidFill>
@@ -4766,9 +4716,6 @@
                       <a:headEnd type="none" w="med" len="med"/>
                       <a:tailEnd type="none" w="med" len="med"/>
                     </a:lnB>
-                    <a:solidFill>
-                      <a:srgbClr val="FFFFFF"/>
-                    </a:solidFill>
                   </a:tcPr>
                 </a:tc>
                 <a:tc>
@@ -4785,7 +4732,7 @@
                           <a:effectLst/>
                           <a:latin typeface="Times New Roman" panose="02020603050405020304" pitchFamily="18" charset="0"/>
                         </a:rPr>
-                        <a:t>787 (2.97)</a:t>
+                        <a:t>835 (3.15)</a:t>
                       </a:r>
                     </a:p>
                   </a:txBody>
@@ -4820,14 +4767,11 @@
                       <a:headEnd type="none" w="med" len="med"/>
                       <a:tailEnd type="none" w="med" len="med"/>
                     </a:lnB>
-                    <a:solidFill>
-                      <a:srgbClr val="FFFFFF"/>
-                    </a:solidFill>
                   </a:tcPr>
                 </a:tc>
                 <a:extLst>
                   <a:ext uri="{0D108BD9-81ED-4DB2-BD59-A6C34878D82A}">
-                    <a16:rowId xmlns:a16="http://schemas.microsoft.com/office/drawing/2014/main" val="1231774187"/>
+                    <a16:rowId xmlns:a16="http://schemas.microsoft.com/office/drawing/2014/main" val="2781386808"/>
                   </a:ext>
                 </a:extLst>
               </a:tr>
@@ -4843,8 +4787,8 @@
         </p:nvSpPr>
         <p:spPr>
           <a:xfrm>
-            <a:off x="9586914" y="5886450"/>
-            <a:ext cx="1900236" cy="371475"/>
+            <a:off x="9186862" y="5772150"/>
+            <a:ext cx="2300287" cy="371475"/>
           </a:xfrm>
           <a:prstGeom prst="rect">
             <a:avLst/>
@@ -4878,53 +4822,6 @@
           <a:p>
             <a:pPr algn="ctr"/>
             <a:endParaRPr lang="en-US"/>
-          </a:p>
-        </p:txBody>
-      </p:sp>
-      <p:sp>
-        <p:nvSpPr>
-          <p:cNvPr id="9" name="TextBox 8"/>
-          <p:cNvSpPr txBox="1"/>
-          <p:nvPr/>
-        </p:nvSpPr>
-        <p:spPr>
-          <a:xfrm>
-            <a:off x="614364" y="400050"/>
-            <a:ext cx="3186112" cy="1938992"/>
-          </a:xfrm>
-          <a:prstGeom prst="rect">
-            <a:avLst/>
-          </a:prstGeom>
-          <a:noFill/>
-        </p:spPr>
-        <p:txBody>
-          <a:bodyPr wrap="square" rtlCol="0">
-            <a:spAutoFit/>
-          </a:bodyPr>
-          <a:lstStyle/>
-          <a:p>
-            <a:pPr algn="ctr"/>
-            <a:r>
-              <a:rPr lang="en-US" sz="4800" dirty="0" smtClean="0">
-                <a:latin typeface="Times New Roman" panose="02020603050405020304" pitchFamily="18" charset="0"/>
-                <a:cs typeface="Times New Roman" panose="02020603050405020304" pitchFamily="18" charset="0"/>
-              </a:rPr>
-              <a:t>Data           Summary</a:t>
-            </a:r>
-          </a:p>
-          <a:p>
-            <a:pPr algn="ctr"/>
-            <a:r>
-              <a:rPr lang="en-US" sz="2400" i="1" dirty="0" smtClean="0">
-                <a:latin typeface="Times New Roman" panose="02020603050405020304" pitchFamily="18" charset="0"/>
-                <a:cs typeface="Times New Roman" panose="02020603050405020304" pitchFamily="18" charset="0"/>
-              </a:rPr>
-              <a:t>last 6 periods (3 years)</a:t>
-            </a:r>
-            <a:endParaRPr lang="en-US" sz="4800" i="1" dirty="0" smtClean="0">
-              <a:latin typeface="Times New Roman" panose="02020603050405020304" pitchFamily="18" charset="0"/>
-              <a:cs typeface="Times New Roman" panose="02020603050405020304" pitchFamily="18" charset="0"/>
-            </a:endParaRPr>
           </a:p>
         </p:txBody>
       </p:sp>
@@ -8537,10 +8434,20 @@
                 <a:latin typeface="Times New Roman" panose="02020603050405020304" pitchFamily="18" charset="0"/>
                 <a:cs typeface="Times New Roman" panose="02020603050405020304" pitchFamily="18" charset="0"/>
               </a:rPr>
-              <a:t>Fixed BMI data issues that were results of wrong units or incorrect calculation</a:t>
+              <a:t>Fixed BMI data issues that were results </a:t>
             </a:r>
-          </a:p>
-          <a:p>
+            <a:r>
+              <a:rPr lang="en-US" sz="3200" dirty="0" smtClean="0">
+                <a:latin typeface="Times New Roman" panose="02020603050405020304" pitchFamily="18" charset="0"/>
+                <a:cs typeface="Times New Roman" panose="02020603050405020304" pitchFamily="18" charset="0"/>
+              </a:rPr>
+              <a:t>of incorrect calculation in period 39</a:t>
+            </a:r>
+          </a:p>
+          <a:p>
+            <a:pPr marL="0" indent="0">
+              <a:buNone/>
+            </a:pPr>
             <a:endParaRPr lang="en-US" sz="3200" dirty="0">
               <a:latin typeface="Times New Roman" panose="02020603050405020304" pitchFamily="18" charset="0"/>
               <a:cs typeface="Times New Roman" panose="02020603050405020304" pitchFamily="18" charset="0"/>

</xml_diff>